<commit_message>
edit stable-matching.pptx simple-k-connect.pptx tree-defs.pptx
</commit_message>
<xml_diff>
--- a/spring13/slides13/simple-k-connect.pptx
+++ b/spring13/slides13/simple-k-connect.pptx
@@ -1069,78 +1069,70 @@
       </p:grpSpPr>
       <p:sp>
         <p:nvSpPr>
-          <p:cNvPr id="28674" name="Rectangle 7"/>
-          <p:cNvSpPr>
-            <a:spLocks noGrp="1" noChangeArrowheads="1"/>
-          </p:cNvSpPr>
-          <p:nvPr>
-            <p:ph type="sldNum" sz="quarter" idx="5"/>
-          </p:nvPr>
-        </p:nvSpPr>
-        <p:spPr>
-          <a:noFill/>
-        </p:spPr>
-        <p:txBody>
-          <a:bodyPr/>
-          <a:lstStyle/>
-          <a:p>
-            <a:fld id="{85F5844E-D5E4-47F6-A744-2E5515C4691E}" type="slidenum">
-              <a:rPr lang="en-US" smtClean="0">
-                <a:latin typeface="Times New Roman" pitchFamily="8" charset="0"/>
-              </a:rPr>
-              <a:pPr/>
-              <a:t>12</a:t>
-            </a:fld>
-            <a:endParaRPr lang="en-US" smtClean="0">
-              <a:latin typeface="Times New Roman" pitchFamily="8" charset="0"/>
-            </a:endParaRPr>
-          </a:p>
-        </p:txBody>
-      </p:sp>
-      <p:sp>
-        <p:nvSpPr>
-          <p:cNvPr id="28675" name="Rectangle 2"/>
-          <p:cNvSpPr>
-            <a:spLocks noGrp="1" noRot="1" noChangeAspect="1" noChangeArrowheads="1" noTextEdit="1"/>
+          <p:cNvPr id="2" name="Slide Image Placeholder 1"/>
+          <p:cNvSpPr>
+            <a:spLocks noGrp="1" noRot="1" noChangeAspect="1"/>
           </p:cNvSpPr>
           <p:nvPr>
             <p:ph type="sldImg"/>
           </p:nvPr>
         </p:nvSpPr>
-        <p:spPr>
-          <a:xfrm>
-            <a:off x="2974975" y="549275"/>
-            <a:ext cx="3657600" cy="2743200"/>
-          </a:xfrm>
-          <a:ln/>
-        </p:spPr>
-      </p:sp>
-      <p:sp>
-        <p:nvSpPr>
-          <p:cNvPr id="28676" name="Rectangle 3"/>
-          <p:cNvSpPr>
-            <a:spLocks noGrp="1" noChangeArrowheads="1"/>
+        <p:spPr/>
+      </p:sp>
+      <p:sp>
+        <p:nvSpPr>
+          <p:cNvPr id="3" name="Notes Placeholder 2"/>
+          <p:cNvSpPr>
+            <a:spLocks noGrp="1"/>
           </p:cNvSpPr>
           <p:nvPr>
             <p:ph type="body" idx="1"/>
           </p:nvPr>
         </p:nvSpPr>
-        <p:spPr>
-          <a:noFill/>
-          <a:ln/>
-        </p:spPr>
+        <p:spPr/>
         <p:txBody>
           <a:bodyPr/>
           <a:lstStyle/>
           <a:p>
-            <a:pPr eaLnBrk="1" hangingPunct="1"/>
-            <a:endParaRPr lang="en-US" smtClean="0">
-              <a:latin typeface="Times New Roman" pitchFamily="8" charset="0"/>
-            </a:endParaRPr>
+            <a:endParaRPr lang="en-US"/>
+          </a:p>
+        </p:txBody>
+      </p:sp>
+      <p:sp>
+        <p:nvSpPr>
+          <p:cNvPr id="4" name="Slide Number Placeholder 3"/>
+          <p:cNvSpPr>
+            <a:spLocks noGrp="1"/>
+          </p:cNvSpPr>
+          <p:nvPr>
+            <p:ph type="sldNum" sz="quarter" idx="10"/>
+          </p:nvPr>
+        </p:nvSpPr>
+        <p:spPr/>
+        <p:txBody>
+          <a:bodyPr/>
+          <a:lstStyle/>
+          <a:p>
+            <a:pPr>
+              <a:defRPr/>
+            </a:pPr>
+            <a:fld id="{BE7B95FB-0FFD-45DC-A496-AD0CACD1DEE5}" type="slidenum">
+              <a:rPr lang="en-US" smtClean="0"/>
+              <a:pPr>
+                <a:defRPr/>
+              </a:pPr>
+              <a:t>11</a:t>
+            </a:fld>
+            <a:endParaRPr lang="en-US"/>
           </a:p>
         </p:txBody>
       </p:sp>
     </p:spTree>
+    <p:extLst>
+      <p:ext uri="{BB962C8B-B14F-4D97-AF65-F5344CB8AC3E}">
+        <p14:creationId xmlns:p14="http://schemas.microsoft.com/office/powerpoint/2010/main" val="1711664028"/>
+      </p:ext>
+    </p:extLst>
   </p:cSld>
   <p:clrMapOvr>
     <a:masterClrMapping/>
@@ -1187,7 +1179,7 @@
                 <a:latin typeface="Times New Roman" pitchFamily="8" charset="0"/>
               </a:rPr>
               <a:pPr/>
-              <a:t>13</a:t>
+              <a:t>12</a:t>
             </a:fld>
             <a:endParaRPr lang="en-US" smtClean="0">
               <a:latin typeface="Times New Roman" pitchFamily="8" charset="0"/>
@@ -1285,7 +1277,7 @@
                 <a:latin typeface="Times New Roman" pitchFamily="8" charset="0"/>
               </a:rPr>
               <a:pPr/>
-              <a:t>14</a:t>
+              <a:t>13</a:t>
             </a:fld>
             <a:endParaRPr lang="en-US" smtClean="0">
               <a:latin typeface="Times New Roman" pitchFamily="8" charset="0"/>
@@ -1383,7 +1375,7 @@
                 <a:latin typeface="Times New Roman" pitchFamily="8" charset="0"/>
               </a:rPr>
               <a:pPr/>
-              <a:t>15</a:t>
+              <a:t>14</a:t>
             </a:fld>
             <a:endParaRPr lang="en-US" smtClean="0">
               <a:latin typeface="Times New Roman" pitchFamily="8" charset="0"/>
@@ -1481,7 +1473,7 @@
                 <a:latin typeface="Times New Roman" pitchFamily="8" charset="0"/>
               </a:rPr>
               <a:pPr/>
-              <a:t>16</a:t>
+              <a:t>15</a:t>
             </a:fld>
             <a:endParaRPr lang="en-US" smtClean="0">
               <a:latin typeface="Times New Roman" pitchFamily="8" charset="0"/>
@@ -1579,7 +1571,7 @@
                 <a:latin typeface="Times New Roman" pitchFamily="8" charset="0"/>
               </a:rPr>
               <a:pPr/>
-              <a:t>17</a:t>
+              <a:t>16</a:t>
             </a:fld>
             <a:endParaRPr lang="en-US" smtClean="0">
               <a:latin typeface="Times New Roman" pitchFamily="8" charset="0"/>
@@ -1677,7 +1669,7 @@
                 <a:latin typeface="Times New Roman" pitchFamily="8" charset="0"/>
               </a:rPr>
               <a:pPr/>
-              <a:t>18</a:t>
+              <a:t>17</a:t>
             </a:fld>
             <a:endParaRPr lang="en-US" smtClean="0">
               <a:latin typeface="Times New Roman" pitchFamily="8" charset="0"/>
@@ -1755,7 +1747,7 @@
       </p:grpSpPr>
       <p:sp>
         <p:nvSpPr>
-          <p:cNvPr id="35842" name="Rectangle 7"/>
+          <p:cNvPr id="28674" name="Rectangle 7"/>
           <p:cNvSpPr>
             <a:spLocks noGrp="1" noChangeArrowheads="1"/>
           </p:cNvSpPr>
@@ -1770,12 +1762,12 @@
           <a:bodyPr/>
           <a:lstStyle/>
           <a:p>
-            <a:fld id="{37ECF619-DC5D-4598-B0E9-D0DECFF1B600}" type="slidenum">
+            <a:fld id="{85F5844E-D5E4-47F6-A744-2E5515C4691E}" type="slidenum">
               <a:rPr lang="en-US" smtClean="0">
                 <a:latin typeface="Times New Roman" pitchFamily="8" charset="0"/>
               </a:rPr>
               <a:pPr/>
-              <a:t>20</a:t>
+              <a:t>18</a:t>
             </a:fld>
             <a:endParaRPr lang="en-US" smtClean="0">
               <a:latin typeface="Times New Roman" pitchFamily="8" charset="0"/>
@@ -1785,7 +1777,7 @@
       </p:sp>
       <p:sp>
         <p:nvSpPr>
-          <p:cNvPr id="35843" name="Rectangle 2"/>
+          <p:cNvPr id="28675" name="Rectangle 2"/>
           <p:cNvSpPr>
             <a:spLocks noGrp="1" noRot="1" noChangeAspect="1" noChangeArrowheads="1" noTextEdit="1"/>
           </p:cNvSpPr>
@@ -1803,7 +1795,7 @@
       </p:sp>
       <p:sp>
         <p:nvSpPr>
-          <p:cNvPr id="35844" name="Rectangle 3"/>
+          <p:cNvPr id="28676" name="Rectangle 3"/>
           <p:cNvSpPr>
             <a:spLocks noGrp="1" noChangeArrowheads="1"/>
           </p:cNvSpPr>
@@ -1853,78 +1845,70 @@
       </p:grpSpPr>
       <p:sp>
         <p:nvSpPr>
-          <p:cNvPr id="35842" name="Rectangle 7"/>
-          <p:cNvSpPr>
-            <a:spLocks noGrp="1" noChangeArrowheads="1"/>
-          </p:cNvSpPr>
-          <p:nvPr>
-            <p:ph type="sldNum" sz="quarter" idx="5"/>
-          </p:nvPr>
-        </p:nvSpPr>
-        <p:spPr>
-          <a:noFill/>
-        </p:spPr>
-        <p:txBody>
-          <a:bodyPr/>
-          <a:lstStyle/>
-          <a:p>
-            <a:fld id="{37ECF619-DC5D-4598-B0E9-D0DECFF1B600}" type="slidenum">
-              <a:rPr lang="en-US" smtClean="0">
-                <a:latin typeface="Times New Roman" pitchFamily="8" charset="0"/>
-              </a:rPr>
-              <a:pPr/>
-              <a:t>21</a:t>
-            </a:fld>
-            <a:endParaRPr lang="en-US" smtClean="0">
-              <a:latin typeface="Times New Roman" pitchFamily="8" charset="0"/>
-            </a:endParaRPr>
-          </a:p>
-        </p:txBody>
-      </p:sp>
-      <p:sp>
-        <p:nvSpPr>
-          <p:cNvPr id="35843" name="Rectangle 2"/>
-          <p:cNvSpPr>
-            <a:spLocks noGrp="1" noRot="1" noChangeAspect="1" noChangeArrowheads="1" noTextEdit="1"/>
+          <p:cNvPr id="2" name="Slide Image Placeholder 1"/>
+          <p:cNvSpPr>
+            <a:spLocks noGrp="1" noRot="1" noChangeAspect="1"/>
           </p:cNvSpPr>
           <p:nvPr>
             <p:ph type="sldImg"/>
           </p:nvPr>
         </p:nvSpPr>
-        <p:spPr>
-          <a:xfrm>
-            <a:off x="2974975" y="549275"/>
-            <a:ext cx="3657600" cy="2743200"/>
-          </a:xfrm>
-          <a:ln/>
-        </p:spPr>
-      </p:sp>
-      <p:sp>
-        <p:nvSpPr>
-          <p:cNvPr id="35844" name="Rectangle 3"/>
-          <p:cNvSpPr>
-            <a:spLocks noGrp="1" noChangeArrowheads="1"/>
+        <p:spPr/>
+      </p:sp>
+      <p:sp>
+        <p:nvSpPr>
+          <p:cNvPr id="3" name="Notes Placeholder 2"/>
+          <p:cNvSpPr>
+            <a:spLocks noGrp="1"/>
           </p:cNvSpPr>
           <p:nvPr>
             <p:ph type="body" idx="1"/>
           </p:nvPr>
         </p:nvSpPr>
-        <p:spPr>
-          <a:noFill/>
-          <a:ln/>
-        </p:spPr>
+        <p:spPr/>
         <p:txBody>
           <a:bodyPr/>
           <a:lstStyle/>
           <a:p>
-            <a:pPr eaLnBrk="1" hangingPunct="1"/>
-            <a:endParaRPr lang="en-US" smtClean="0">
-              <a:latin typeface="Times New Roman" pitchFamily="8" charset="0"/>
-            </a:endParaRPr>
+            <a:endParaRPr lang="en-US"/>
+          </a:p>
+        </p:txBody>
+      </p:sp>
+      <p:sp>
+        <p:nvSpPr>
+          <p:cNvPr id="4" name="Slide Number Placeholder 3"/>
+          <p:cNvSpPr>
+            <a:spLocks noGrp="1"/>
+          </p:cNvSpPr>
+          <p:nvPr>
+            <p:ph type="sldNum" sz="quarter" idx="10"/>
+          </p:nvPr>
+        </p:nvSpPr>
+        <p:spPr/>
+        <p:txBody>
+          <a:bodyPr/>
+          <a:lstStyle/>
+          <a:p>
+            <a:pPr>
+              <a:defRPr/>
+            </a:pPr>
+            <a:fld id="{BE7B95FB-0FFD-45DC-A496-AD0CACD1DEE5}" type="slidenum">
+              <a:rPr lang="en-US" smtClean="0"/>
+              <a:pPr>
+                <a:defRPr/>
+              </a:pPr>
+              <a:t>19</a:t>
+            </a:fld>
+            <a:endParaRPr lang="en-US"/>
           </a:p>
         </p:txBody>
       </p:sp>
     </p:spTree>
+    <p:extLst>
+      <p:ext uri="{BB962C8B-B14F-4D97-AF65-F5344CB8AC3E}">
+        <p14:creationId xmlns:p14="http://schemas.microsoft.com/office/powerpoint/2010/main" val="3507181093"/>
+      </p:ext>
+    </p:extLst>
   </p:cSld>
   <p:clrMapOvr>
     <a:masterClrMapping/>
@@ -2031,6 +2015,202 @@
 </file>
 
 <file path=ppt/notesSlides/notesSlide20.xml><?xml version="1.0" encoding="utf-8"?>
+<p:notes xmlns:a="http://schemas.openxmlformats.org/drawingml/2006/main" xmlns:r="http://schemas.openxmlformats.org/officeDocument/2006/relationships" xmlns:p="http://schemas.openxmlformats.org/presentationml/2006/main">
+  <p:cSld>
+    <p:spTree>
+      <p:nvGrpSpPr>
+        <p:cNvPr id="1" name=""/>
+        <p:cNvGrpSpPr/>
+        <p:nvPr/>
+      </p:nvGrpSpPr>
+      <p:grpSpPr>
+        <a:xfrm>
+          <a:off x="0" y="0"/>
+          <a:ext cx="0" cy="0"/>
+          <a:chOff x="0" y="0"/>
+          <a:chExt cx="0" cy="0"/>
+        </a:xfrm>
+      </p:grpSpPr>
+      <p:sp>
+        <p:nvSpPr>
+          <p:cNvPr id="35842" name="Rectangle 7"/>
+          <p:cNvSpPr>
+            <a:spLocks noGrp="1" noChangeArrowheads="1"/>
+          </p:cNvSpPr>
+          <p:nvPr>
+            <p:ph type="sldNum" sz="quarter" idx="5"/>
+          </p:nvPr>
+        </p:nvSpPr>
+        <p:spPr>
+          <a:noFill/>
+        </p:spPr>
+        <p:txBody>
+          <a:bodyPr/>
+          <a:lstStyle/>
+          <a:p>
+            <a:fld id="{37ECF619-DC5D-4598-B0E9-D0DECFF1B600}" type="slidenum">
+              <a:rPr lang="en-US" smtClean="0">
+                <a:latin typeface="Times New Roman" pitchFamily="8" charset="0"/>
+              </a:rPr>
+              <a:pPr/>
+              <a:t>20</a:t>
+            </a:fld>
+            <a:endParaRPr lang="en-US" smtClean="0">
+              <a:latin typeface="Times New Roman" pitchFamily="8" charset="0"/>
+            </a:endParaRPr>
+          </a:p>
+        </p:txBody>
+      </p:sp>
+      <p:sp>
+        <p:nvSpPr>
+          <p:cNvPr id="35843" name="Rectangle 2"/>
+          <p:cNvSpPr>
+            <a:spLocks noGrp="1" noRot="1" noChangeAspect="1" noChangeArrowheads="1" noTextEdit="1"/>
+          </p:cNvSpPr>
+          <p:nvPr>
+            <p:ph type="sldImg"/>
+          </p:nvPr>
+        </p:nvSpPr>
+        <p:spPr>
+          <a:xfrm>
+            <a:off x="2974975" y="549275"/>
+            <a:ext cx="3657600" cy="2743200"/>
+          </a:xfrm>
+          <a:ln/>
+        </p:spPr>
+      </p:sp>
+      <p:sp>
+        <p:nvSpPr>
+          <p:cNvPr id="35844" name="Rectangle 3"/>
+          <p:cNvSpPr>
+            <a:spLocks noGrp="1" noChangeArrowheads="1"/>
+          </p:cNvSpPr>
+          <p:nvPr>
+            <p:ph type="body" idx="1"/>
+          </p:nvPr>
+        </p:nvSpPr>
+        <p:spPr>
+          <a:noFill/>
+          <a:ln/>
+        </p:spPr>
+        <p:txBody>
+          <a:bodyPr/>
+          <a:lstStyle/>
+          <a:p>
+            <a:pPr eaLnBrk="1" hangingPunct="1"/>
+            <a:endParaRPr lang="en-US" smtClean="0">
+              <a:latin typeface="Times New Roman" pitchFamily="8" charset="0"/>
+            </a:endParaRPr>
+          </a:p>
+        </p:txBody>
+      </p:sp>
+    </p:spTree>
+  </p:cSld>
+  <p:clrMapOvr>
+    <a:masterClrMapping/>
+  </p:clrMapOvr>
+</p:notes>
+</file>
+
+<file path=ppt/notesSlides/notesSlide21.xml><?xml version="1.0" encoding="utf-8"?>
+<p:notes xmlns:a="http://schemas.openxmlformats.org/drawingml/2006/main" xmlns:r="http://schemas.openxmlformats.org/officeDocument/2006/relationships" xmlns:p="http://schemas.openxmlformats.org/presentationml/2006/main">
+  <p:cSld>
+    <p:spTree>
+      <p:nvGrpSpPr>
+        <p:cNvPr id="1" name=""/>
+        <p:cNvGrpSpPr/>
+        <p:nvPr/>
+      </p:nvGrpSpPr>
+      <p:grpSpPr>
+        <a:xfrm>
+          <a:off x="0" y="0"/>
+          <a:ext cx="0" cy="0"/>
+          <a:chOff x="0" y="0"/>
+          <a:chExt cx="0" cy="0"/>
+        </a:xfrm>
+      </p:grpSpPr>
+      <p:sp>
+        <p:nvSpPr>
+          <p:cNvPr id="35842" name="Rectangle 7"/>
+          <p:cNvSpPr>
+            <a:spLocks noGrp="1" noChangeArrowheads="1"/>
+          </p:cNvSpPr>
+          <p:nvPr>
+            <p:ph type="sldNum" sz="quarter" idx="5"/>
+          </p:nvPr>
+        </p:nvSpPr>
+        <p:spPr>
+          <a:noFill/>
+        </p:spPr>
+        <p:txBody>
+          <a:bodyPr/>
+          <a:lstStyle/>
+          <a:p>
+            <a:fld id="{37ECF619-DC5D-4598-B0E9-D0DECFF1B600}" type="slidenum">
+              <a:rPr lang="en-US" smtClean="0">
+                <a:latin typeface="Times New Roman" pitchFamily="8" charset="0"/>
+              </a:rPr>
+              <a:pPr/>
+              <a:t>21</a:t>
+            </a:fld>
+            <a:endParaRPr lang="en-US" smtClean="0">
+              <a:latin typeface="Times New Roman" pitchFamily="8" charset="0"/>
+            </a:endParaRPr>
+          </a:p>
+        </p:txBody>
+      </p:sp>
+      <p:sp>
+        <p:nvSpPr>
+          <p:cNvPr id="35843" name="Rectangle 2"/>
+          <p:cNvSpPr>
+            <a:spLocks noGrp="1" noRot="1" noChangeAspect="1" noChangeArrowheads="1" noTextEdit="1"/>
+          </p:cNvSpPr>
+          <p:nvPr>
+            <p:ph type="sldImg"/>
+          </p:nvPr>
+        </p:nvSpPr>
+        <p:spPr>
+          <a:xfrm>
+            <a:off x="2974975" y="549275"/>
+            <a:ext cx="3657600" cy="2743200"/>
+          </a:xfrm>
+          <a:ln/>
+        </p:spPr>
+      </p:sp>
+      <p:sp>
+        <p:nvSpPr>
+          <p:cNvPr id="35844" name="Rectangle 3"/>
+          <p:cNvSpPr>
+            <a:spLocks noGrp="1" noChangeArrowheads="1"/>
+          </p:cNvSpPr>
+          <p:nvPr>
+            <p:ph type="body" idx="1"/>
+          </p:nvPr>
+        </p:nvSpPr>
+        <p:spPr>
+          <a:noFill/>
+          <a:ln/>
+        </p:spPr>
+        <p:txBody>
+          <a:bodyPr/>
+          <a:lstStyle/>
+          <a:p>
+            <a:pPr eaLnBrk="1" hangingPunct="1"/>
+            <a:endParaRPr lang="en-US" smtClean="0">
+              <a:latin typeface="Times New Roman" pitchFamily="8" charset="0"/>
+            </a:endParaRPr>
+          </a:p>
+        </p:txBody>
+      </p:sp>
+    </p:spTree>
+  </p:cSld>
+  <p:clrMapOvr>
+    <a:masterClrMapping/>
+  </p:clrMapOvr>
+</p:notes>
+</file>
+
+<file path=ppt/notesSlides/notesSlide22.xml><?xml version="1.0" encoding="utf-8"?>
 <p:notes xmlns:a="http://schemas.openxmlformats.org/drawingml/2006/main" xmlns:r="http://schemas.openxmlformats.org/officeDocument/2006/relationships" xmlns:p="http://schemas.openxmlformats.org/presentationml/2006/main">
   <p:cSld>
     <p:spTree>
@@ -7388,9 +7568,6 @@
           <a:p>
             <a:r>
               <a:rPr lang="en-US" sz="8000" dirty="0" smtClean="0">
-                <a:solidFill>
-                  <a:srgbClr val="930093"/>
-                </a:solidFill>
                 <a:latin typeface="+mj-lt"/>
               </a:rPr>
               <a:t>connectedness</a:t>
@@ -9093,7 +9270,7 @@
           <a:graphicData uri="http://schemas.openxmlformats.org/presentationml/2006/ole">
             <mc:AlternateContent xmlns:mc="http://schemas.openxmlformats.org/markup-compatibility/2006">
               <mc:Choice xmlns:v="urn:schemas-microsoft-com:vml" Requires="v">
-                <p:oleObj spid="_x0000_s1038" name="Equation" r:id="rId4" imgW="482600" imgH="330200" progId="Equation.DSMT4">
+                <p:oleObj spid="_x0000_s1043" name="Equation" r:id="rId4" imgW="482600" imgH="330200" progId="Equation.DSMT4">
                   <p:embed/>
                 </p:oleObj>
               </mc:Choice>
@@ -9766,9 +9943,182 @@
   <p:timing>
     <p:tnLst>
       <p:par>
-        <p:cTn xmlns:p14="http://schemas.microsoft.com/office/powerpoint/2010/main" id="1" dur="indefinite" restart="never" nodeType="tmRoot"/>
+        <p:cTn xmlns:p14="http://schemas.microsoft.com/office/powerpoint/2010/main" id="1" dur="indefinite" restart="never" nodeType="tmRoot">
+          <p:childTnLst>
+            <p:seq concurrent="1" nextAc="seek">
+              <p:cTn id="2" dur="indefinite" nodeType="mainSeq">
+                <p:childTnLst>
+                  <p:par>
+                    <p:cTn id="3" fill="hold">
+                      <p:stCondLst>
+                        <p:cond delay="indefinite"/>
+                      </p:stCondLst>
+                      <p:childTnLst>
+                        <p:par>
+                          <p:cTn id="4" fill="hold">
+                            <p:stCondLst>
+                              <p:cond delay="0"/>
+                            </p:stCondLst>
+                            <p:childTnLst>
+                              <p:par>
+                                <p:cTn id="5" presetID="10" presetClass="entr" presetSubtype="0" fill="hold" grpId="0" nodeType="clickEffect">
+                                  <p:stCondLst>
+                                    <p:cond delay="0"/>
+                                  </p:stCondLst>
+                                  <p:childTnLst>
+                                    <p:set>
+                                      <p:cBhvr>
+                                        <p:cTn id="6" dur="1" fill="hold">
+                                          <p:stCondLst>
+                                            <p:cond delay="0"/>
+                                          </p:stCondLst>
+                                        </p:cTn>
+                                        <p:tgtEl>
+                                          <p:spTgt spid="3">
+                                            <p:txEl>
+                                              <p:pRg st="0" end="0"/>
+                                            </p:txEl>
+                                          </p:spTgt>
+                                        </p:tgtEl>
+                                        <p:attrNameLst>
+                                          <p:attrName>style.visibility</p:attrName>
+                                        </p:attrNameLst>
+                                      </p:cBhvr>
+                                      <p:to>
+                                        <p:strVal val="visible"/>
+                                      </p:to>
+                                    </p:set>
+                                    <p:animEffect transition="in" filter="fade">
+                                      <p:cBhvr>
+                                        <p:cTn id="7" dur="500"/>
+                                        <p:tgtEl>
+                                          <p:spTgt spid="3">
+                                            <p:txEl>
+                                              <p:pRg st="0" end="0"/>
+                                            </p:txEl>
+                                          </p:spTgt>
+                                        </p:tgtEl>
+                                      </p:cBhvr>
+                                    </p:animEffect>
+                                  </p:childTnLst>
+                                </p:cTn>
+                              </p:par>
+                              <p:par>
+                                <p:cTn id="8" presetID="10" presetClass="entr" presetSubtype="0" fill="hold" grpId="0" nodeType="withEffect">
+                                  <p:stCondLst>
+                                    <p:cond delay="0"/>
+                                  </p:stCondLst>
+                                  <p:childTnLst>
+                                    <p:set>
+                                      <p:cBhvr>
+                                        <p:cTn id="9" dur="1" fill="hold">
+                                          <p:stCondLst>
+                                            <p:cond delay="0"/>
+                                          </p:stCondLst>
+                                        </p:cTn>
+                                        <p:tgtEl>
+                                          <p:spTgt spid="3">
+                                            <p:txEl>
+                                              <p:pRg st="1" end="1"/>
+                                            </p:txEl>
+                                          </p:spTgt>
+                                        </p:tgtEl>
+                                        <p:attrNameLst>
+                                          <p:attrName>style.visibility</p:attrName>
+                                        </p:attrNameLst>
+                                      </p:cBhvr>
+                                      <p:to>
+                                        <p:strVal val="visible"/>
+                                      </p:to>
+                                    </p:set>
+                                    <p:animEffect transition="in" filter="fade">
+                                      <p:cBhvr>
+                                        <p:cTn id="10" dur="500"/>
+                                        <p:tgtEl>
+                                          <p:spTgt spid="3">
+                                            <p:txEl>
+                                              <p:pRg st="1" end="1"/>
+                                            </p:txEl>
+                                          </p:spTgt>
+                                        </p:tgtEl>
+                                      </p:cBhvr>
+                                    </p:animEffect>
+                                  </p:childTnLst>
+                                </p:cTn>
+                              </p:par>
+                              <p:par>
+                                <p:cTn id="11" presetID="10" presetClass="entr" presetSubtype="0" fill="hold" grpId="0" nodeType="withEffect">
+                                  <p:stCondLst>
+                                    <p:cond delay="0"/>
+                                  </p:stCondLst>
+                                  <p:childTnLst>
+                                    <p:set>
+                                      <p:cBhvr>
+                                        <p:cTn id="12" dur="1" fill="hold">
+                                          <p:stCondLst>
+                                            <p:cond delay="0"/>
+                                          </p:stCondLst>
+                                        </p:cTn>
+                                        <p:tgtEl>
+                                          <p:spTgt spid="3">
+                                            <p:txEl>
+                                              <p:pRg st="2" end="2"/>
+                                            </p:txEl>
+                                          </p:spTgt>
+                                        </p:tgtEl>
+                                        <p:attrNameLst>
+                                          <p:attrName>style.visibility</p:attrName>
+                                        </p:attrNameLst>
+                                      </p:cBhvr>
+                                      <p:to>
+                                        <p:strVal val="visible"/>
+                                      </p:to>
+                                    </p:set>
+                                    <p:animEffect transition="in" filter="fade">
+                                      <p:cBhvr>
+                                        <p:cTn id="13" dur="500"/>
+                                        <p:tgtEl>
+                                          <p:spTgt spid="3">
+                                            <p:txEl>
+                                              <p:pRg st="2" end="2"/>
+                                            </p:txEl>
+                                          </p:spTgt>
+                                        </p:tgtEl>
+                                      </p:cBhvr>
+                                    </p:animEffect>
+                                  </p:childTnLst>
+                                </p:cTn>
+                              </p:par>
+                            </p:childTnLst>
+                          </p:cTn>
+                        </p:par>
+                      </p:childTnLst>
+                    </p:cTn>
+                  </p:par>
+                </p:childTnLst>
+              </p:cTn>
+              <p:prevCondLst>
+                <p:cond evt="onPrev" delay="0">
+                  <p:tgtEl>
+                    <p:sldTgt/>
+                  </p:tgtEl>
+                </p:cond>
+              </p:prevCondLst>
+              <p:nextCondLst>
+                <p:cond evt="onNext" delay="0">
+                  <p:tgtEl>
+                    <p:sldTgt/>
+                  </p:tgtEl>
+                </p:cond>
+              </p:nextCondLst>
+            </p:seq>
+          </p:childTnLst>
+        </p:cTn>
       </p:par>
     </p:tnLst>
+    <p:bldLst>
+      <p:bldP spid="3" grpId="0" build="p"/>
+    </p:bldLst>
   </p:timing>
 </p:sld>
 </file>
@@ -10225,7 +10575,6 @@
               <a:rPr lang="en-US" dirty="0" smtClean="0"/>
               <a:t>k-connectivity</a:t>
             </a:r>
-            <a:endParaRPr lang="en-US" dirty="0" smtClean="0"/>
           </a:p>
         </p:txBody>
       </p:sp>
@@ -10308,16 +10657,7 @@
                 </a:solidFill>
                 <a:latin typeface="Comic Sans MS" pitchFamily="8" charset="0"/>
               </a:rPr>
-              <a:t>of a </a:t>
-            </a:r>
-            <a:r>
-              <a:rPr lang="en-US" sz="3200" b="1" dirty="0" smtClean="0">
-                <a:solidFill>
-                  <a:schemeClr val="tx2"/>
-                </a:solidFill>
-                <a:latin typeface="Comic Sans MS" pitchFamily="8" charset="0"/>
-              </a:rPr>
-              <a:t>network</a:t>
+              <a:t>of a network</a:t>
             </a:r>
             <a:endParaRPr lang="en-US" sz="3200" b="1" dirty="0">
               <a:solidFill>
@@ -10333,13 +10673,13 @@
   <p:clrMapOvr>
     <a:masterClrMapping/>
   </p:clrMapOvr>
-  <mc:AlternateContent xmlns:mc="http://schemas.openxmlformats.org/markup-compatibility/2006">
-    <mc:Choice xmlns:p14="http://schemas.microsoft.com/office/powerpoint/2010/main" Requires="p14">
+  <mc:AlternateContent xmlns:mc="http://schemas.openxmlformats.org/markup-compatibility/2006" xmlns:p14="http://schemas.microsoft.com/office/powerpoint/2010/main">
+    <mc:Choice Requires="p14">
       <p:transition spd="slow" p14:dur="1200" advClick="0">
         <p:fade thruBlk="1"/>
       </p:transition>
     </mc:Choice>
-    <mc:Fallback>
+    <mc:Fallback xmlns="">
       <p:transition xmlns:p14="http://schemas.microsoft.com/office/powerpoint/2010/main" spd="slow" advClick="0">
         <p:fade thruBlk="1"/>
       </p:transition>
@@ -10549,7 +10889,6 @@
               <a:rPr lang="en-US" dirty="0" smtClean="0"/>
               <a:t>k-connectivity</a:t>
             </a:r>
-            <a:endParaRPr lang="en-US" dirty="0" smtClean="0"/>
           </a:p>
         </p:txBody>
       </p:sp>
@@ -10736,12 +11075,6 @@
               </a:rPr>
               <a:t>1</a:t>
             </a:r>
-            <a:endParaRPr lang="en-US" sz="3200" b="1" dirty="0" smtClean="0">
-              <a:solidFill>
-                <a:schemeClr val="tx2"/>
-              </a:solidFill>
-              <a:latin typeface="Comic Sans MS" pitchFamily="8" charset="0"/>
-            </a:endParaRPr>
           </a:p>
           <a:p>
             <a:r>
@@ -10751,7 +11084,16 @@
                 </a:solidFill>
                 <a:latin typeface="Comic Sans MS" pitchFamily="8" charset="0"/>
               </a:rPr>
-              <a:t>Cycle                </a:t>
+              <a:t>Cycle                2</a:t>
+            </a:r>
+            <a:r>
+              <a:rPr lang="en-US" sz="3200" b="1" dirty="0">
+                <a:solidFill>
+                  <a:schemeClr val="tx2"/>
+                </a:solidFill>
+                <a:latin typeface="Comic Sans MS" pitchFamily="8" charset="0"/>
+              </a:rPr>
+              <a:t>,       </a:t>
             </a:r>
             <a:r>
               <a:rPr lang="en-US" sz="3200" b="1" dirty="0" smtClean="0">
@@ -10760,17 +11102,10 @@
                 </a:solidFill>
                 <a:latin typeface="Comic Sans MS" pitchFamily="8" charset="0"/>
               </a:rPr>
-              <a:t>2</a:t>
-            </a:r>
-            <a:r>
-              <a:rPr lang="en-US" sz="3200" b="1" dirty="0">
-                <a:solidFill>
-                  <a:schemeClr val="tx2"/>
-                </a:solidFill>
-                <a:latin typeface="Comic Sans MS" pitchFamily="8" charset="0"/>
-              </a:rPr>
-              <a:t>,       </a:t>
-            </a:r>
+              <a:t>  n</a:t>
+            </a:r>
+          </a:p>
+          <a:p>
             <a:r>
               <a:rPr lang="en-US" sz="3200" b="1" dirty="0" smtClean="0">
                 <a:solidFill>
@@ -10778,36 +11113,7 @@
                 </a:solidFill>
                 <a:latin typeface="Comic Sans MS" pitchFamily="8" charset="0"/>
               </a:rPr>
-              <a:t>  n</a:t>
-            </a:r>
-          </a:p>
-          <a:p>
-            <a:r>
-              <a:rPr lang="en-US" sz="3200" b="1" dirty="0" smtClean="0">
-                <a:solidFill>
-                  <a:schemeClr val="tx2"/>
-                </a:solidFill>
-                <a:latin typeface="Comic Sans MS" pitchFamily="8" charset="0"/>
-              </a:rPr>
-              <a:t>Grid                 4,        </a:t>
-            </a:r>
-            <a:r>
-              <a:rPr lang="en-US" sz="3200" b="1" dirty="0" smtClean="0">
-                <a:solidFill>
-                  <a:schemeClr val="tx2"/>
-                </a:solidFill>
-                <a:latin typeface="Comic Sans MS" pitchFamily="8" charset="0"/>
-              </a:rPr>
-              <a:t> </a:t>
-            </a:r>
-            <a:r>
-              <a:rPr lang="en-US" sz="3200" b="1" dirty="0" smtClean="0">
-                <a:solidFill>
-                  <a:schemeClr val="tx2"/>
-                </a:solidFill>
-                <a:latin typeface="Comic Sans MS" pitchFamily="8" charset="0"/>
-              </a:rPr>
-              <a:t>2n</a:t>
+              <a:t>Grid                 4,         2n</a:t>
             </a:r>
           </a:p>
           <a:p>
@@ -11483,7 +11789,6 @@
               <a:rPr lang="en-US" dirty="0" smtClean="0"/>
               <a:t>k-connectivity</a:t>
             </a:r>
-            <a:endParaRPr lang="en-US" dirty="0" smtClean="0"/>
           </a:p>
         </p:txBody>
       </p:sp>
@@ -11796,13 +12101,13 @@
   <p:clrMapOvr>
     <a:masterClrMapping/>
   </p:clrMapOvr>
-  <mc:AlternateContent xmlns:mc="http://schemas.openxmlformats.org/markup-compatibility/2006">
-    <mc:Choice xmlns:p14="http://schemas.microsoft.com/office/powerpoint/2010/main" Requires="p14">
+  <mc:AlternateContent xmlns:mc="http://schemas.openxmlformats.org/markup-compatibility/2006" xmlns:p14="http://schemas.microsoft.com/office/powerpoint/2010/main">
+    <mc:Choice Requires="p14">
       <p:transition spd="slow" p14:dur="800" advClick="0">
         <p:fade/>
       </p:transition>
     </mc:Choice>
-    <mc:Fallback>
+    <mc:Fallback xmlns="">
       <p:transition xmlns:p14="http://schemas.microsoft.com/office/powerpoint/2010/main" spd="slow" advClick="0">
         <p:fade/>
       </p:transition>
@@ -16440,13 +16745,13 @@
   <p:clrMapOvr>
     <a:masterClrMapping/>
   </p:clrMapOvr>
-  <mc:AlternateContent xmlns:mc="http://schemas.openxmlformats.org/markup-compatibility/2006">
-    <mc:Choice xmlns:p14="http://schemas.microsoft.com/office/powerpoint/2010/main" Requires="p14">
+  <mc:AlternateContent xmlns:mc="http://schemas.openxmlformats.org/markup-compatibility/2006" xmlns:p14="http://schemas.microsoft.com/office/powerpoint/2010/main">
+    <mc:Choice Requires="p14">
       <p:transition spd="med" p14:dur="700" advClick="0">
         <p:fade/>
       </p:transition>
     </mc:Choice>
-    <mc:Fallback>
+    <mc:Fallback xmlns="">
       <p:transition xmlns:p14="http://schemas.microsoft.com/office/powerpoint/2010/main" spd="med" advClick="0">
         <p:fade/>
       </p:transition>

</xml_diff>